<commit_message>
fix: presentation now is better
</commit_message>
<xml_diff>
--- a/lab2/presentationLab2.pptx
+++ b/lab2/presentationLab2.pptx
@@ -118,6 +118,11 @@
       </a:defRPr>
     </a:lvl9pPr>
   </p:defaultTextStyle>
+  <p:extLst>
+    <p:ext uri="{EFAFB233-063F-42B5-8137-9DF3F51BA10A}">
+      <p15:sldGuideLst xmlns:p15="http://schemas.microsoft.com/office/powerpoint/2012/main"/>
+    </p:ext>
+  </p:extLst>
 </p:presentation>
 </file>
 
@@ -313,7 +318,7 @@
             <a:fld id="{B61BEF0D-F0BB-DE4B-95CE-6DB70DBA9567}" type="datetimeFigureOut">
               <a:rPr lang="en-US" dirty="0"/>
               <a:pPr/>
-              <a:t>11/5/2022</a:t>
+              <a:t>11/7/2022</a:t>
             </a:fld>
             <a:endParaRPr lang="en-US" dirty="0"/>
           </a:p>
@@ -746,7 +751,7 @@
             <a:fld id="{B61BEF0D-F0BB-DE4B-95CE-6DB70DBA9567}" type="datetimeFigureOut">
               <a:rPr lang="en-US" dirty="0"/>
               <a:pPr/>
-              <a:t>11/5/2022</a:t>
+              <a:t>11/7/2022</a:t>
             </a:fld>
             <a:endParaRPr lang="en-US" dirty="0"/>
           </a:p>
@@ -993,7 +998,7 @@
             <a:fld id="{B61BEF0D-F0BB-DE4B-95CE-6DB70DBA9567}" type="datetimeFigureOut">
               <a:rPr lang="en-US" dirty="0"/>
               <a:pPr/>
-              <a:t>11/5/2022</a:t>
+              <a:t>11/7/2022</a:t>
             </a:fld>
             <a:endParaRPr lang="en-US" dirty="0"/>
           </a:p>
@@ -1298,7 +1303,7 @@
             <a:fld id="{B61BEF0D-F0BB-DE4B-95CE-6DB70DBA9567}" type="datetimeFigureOut">
               <a:rPr lang="en-US" dirty="0"/>
               <a:pPr/>
-              <a:t>11/5/2022</a:t>
+              <a:t>11/7/2022</a:t>
             </a:fld>
             <a:endParaRPr lang="en-US" dirty="0"/>
           </a:p>
@@ -1613,7 +1618,7 @@
             <a:fld id="{B61BEF0D-F0BB-DE4B-95CE-6DB70DBA9567}" type="datetimeFigureOut">
               <a:rPr lang="en-US" dirty="0"/>
               <a:pPr/>
-              <a:t>11/5/2022</a:t>
+              <a:t>11/7/2022</a:t>
             </a:fld>
             <a:endParaRPr lang="en-US" dirty="0"/>
           </a:p>
@@ -1912,7 +1917,7 @@
             <a:fld id="{B61BEF0D-F0BB-DE4B-95CE-6DB70DBA9567}" type="datetimeFigureOut">
               <a:rPr lang="en-US" dirty="0"/>
               <a:pPr/>
-              <a:t>11/5/2022</a:t>
+              <a:t>11/7/2022</a:t>
             </a:fld>
             <a:endParaRPr lang="en-US" dirty="0"/>
           </a:p>
@@ -2276,7 +2281,7 @@
             <a:fld id="{B61BEF0D-F0BB-DE4B-95CE-6DB70DBA9567}" type="datetimeFigureOut">
               <a:rPr lang="en-US" dirty="0"/>
               <a:pPr/>
-              <a:t>11/5/2022</a:t>
+              <a:t>11/7/2022</a:t>
             </a:fld>
             <a:endParaRPr lang="en-US" dirty="0"/>
           </a:p>
@@ -2447,7 +2452,7 @@
             <a:fld id="{B61BEF0D-F0BB-DE4B-95CE-6DB70DBA9567}" type="datetimeFigureOut">
               <a:rPr lang="en-US" dirty="0"/>
               <a:pPr/>
-              <a:t>11/5/2022</a:t>
+              <a:t>11/7/2022</a:t>
             </a:fld>
             <a:endParaRPr lang="en-US" dirty="0"/>
           </a:p>
@@ -2624,7 +2629,7 @@
             <a:fld id="{B61BEF0D-F0BB-DE4B-95CE-6DB70DBA9567}" type="datetimeFigureOut">
               <a:rPr lang="en-US" dirty="0"/>
               <a:pPr/>
-              <a:t>11/5/2022</a:t>
+              <a:t>11/7/2022</a:t>
             </a:fld>
             <a:endParaRPr lang="en-US" dirty="0"/>
           </a:p>
@@ -2791,7 +2796,7 @@
             <a:fld id="{B61BEF0D-F0BB-DE4B-95CE-6DB70DBA9567}" type="datetimeFigureOut">
               <a:rPr lang="en-US" dirty="0"/>
               <a:pPr/>
-              <a:t>11/5/2022</a:t>
+              <a:t>11/7/2022</a:t>
             </a:fld>
             <a:endParaRPr lang="en-US" dirty="0"/>
           </a:p>
@@ -3038,7 +3043,7 @@
             <a:fld id="{B61BEF0D-F0BB-DE4B-95CE-6DB70DBA9567}" type="datetimeFigureOut">
               <a:rPr lang="en-US" dirty="0"/>
               <a:pPr/>
-              <a:t>11/5/2022</a:t>
+              <a:t>11/7/2022</a:t>
             </a:fld>
             <a:endParaRPr lang="en-US" dirty="0"/>
           </a:p>
@@ -3271,7 +3276,7 @@
             <a:fld id="{B61BEF0D-F0BB-DE4B-95CE-6DB70DBA9567}" type="datetimeFigureOut">
               <a:rPr lang="en-US" dirty="0"/>
               <a:pPr/>
-              <a:t>11/5/2022</a:t>
+              <a:t>11/7/2022</a:t>
             </a:fld>
             <a:endParaRPr lang="en-US" dirty="0"/>
           </a:p>
@@ -3650,7 +3655,7 @@
             <a:fld id="{B61BEF0D-F0BB-DE4B-95CE-6DB70DBA9567}" type="datetimeFigureOut">
               <a:rPr lang="en-US" dirty="0"/>
               <a:pPr/>
-              <a:t>11/5/2022</a:t>
+              <a:t>11/7/2022</a:t>
             </a:fld>
             <a:endParaRPr lang="en-US" dirty="0"/>
           </a:p>
@@ -3765,7 +3770,7 @@
             <a:fld id="{B61BEF0D-F0BB-DE4B-95CE-6DB70DBA9567}" type="datetimeFigureOut">
               <a:rPr lang="en-US" dirty="0"/>
               <a:pPr/>
-              <a:t>11/5/2022</a:t>
+              <a:t>11/7/2022</a:t>
             </a:fld>
             <a:endParaRPr lang="en-US" dirty="0"/>
           </a:p>
@@ -3857,7 +3862,7 @@
             <a:fld id="{B61BEF0D-F0BB-DE4B-95CE-6DB70DBA9567}" type="datetimeFigureOut">
               <a:rPr lang="en-US" dirty="0"/>
               <a:pPr/>
-              <a:t>11/5/2022</a:t>
+              <a:t>11/7/2022</a:t>
             </a:fld>
             <a:endParaRPr lang="en-US" dirty="0"/>
           </a:p>
@@ -4109,7 +4114,7 @@
             <a:fld id="{B61BEF0D-F0BB-DE4B-95CE-6DB70DBA9567}" type="datetimeFigureOut">
               <a:rPr lang="en-US" dirty="0"/>
               <a:pPr/>
-              <a:t>11/5/2022</a:t>
+              <a:t>11/7/2022</a:t>
             </a:fld>
             <a:endParaRPr lang="en-US" dirty="0"/>
           </a:p>
@@ -4389,7 +4394,7 @@
             <a:fld id="{B61BEF0D-F0BB-DE4B-95CE-6DB70DBA9567}" type="datetimeFigureOut">
               <a:rPr lang="en-US" dirty="0"/>
               <a:pPr/>
-              <a:t>11/5/2022</a:t>
+              <a:t>11/7/2022</a:t>
             </a:fld>
             <a:endParaRPr lang="en-US" dirty="0"/>
           </a:p>
@@ -4792,7 +4797,7 @@
             <a:fld id="{B61BEF0D-F0BB-DE4B-95CE-6DB70DBA9567}" type="datetimeFigureOut">
               <a:rPr lang="en-US" dirty="0"/>
               <a:pPr/>
-              <a:t>11/5/2022</a:t>
+              <a:t>11/7/2022</a:t>
             </a:fld>
             <a:endParaRPr lang="en-US" dirty="0"/>
           </a:p>
@@ -7341,45 +7346,6 @@
           </a:p>
         </p:txBody>
       </p:sp>
-      <p:pic>
-        <p:nvPicPr>
-          <p:cNvPr id="1026" name="Picture 2" descr="Create meme &quot;Al Pacino , Tony Montana , al Pacino Scarface cocaine&quot; -  Pictures - Meme-arsenal.com"/>
-          <p:cNvPicPr>
-            <a:picLocks noChangeAspect="1" noChangeArrowheads="1"/>
-          </p:cNvPicPr>
-          <p:nvPr/>
-        </p:nvPicPr>
-        <p:blipFill rotWithShape="1">
-          <a:blip r:embed="rId3">
-            <a:extLst>
-              <a:ext uri="{28A0092B-C50C-407E-A947-70E740481C1C}">
-                <a14:useLocalDpi xmlns:a14="http://schemas.microsoft.com/office/drawing/2010/main" val="0"/>
-              </a:ext>
-            </a:extLst>
-          </a:blip>
-          <a:srcRect l="25079" r="22433" b="20487"/>
-          <a:stretch/>
-        </p:blipFill>
-        <p:spPr bwMode="auto">
-          <a:xfrm>
-            <a:off x="9218612" y="4487332"/>
-            <a:ext cx="2757715" cy="2088795"/>
-          </a:xfrm>
-          <a:prstGeom prst="rect">
-            <a:avLst/>
-          </a:prstGeom>
-          <a:noFill/>
-          <a:extLst>
-            <a:ext uri="{909E8E84-426E-40DD-AFC4-6F175D3DCCD1}">
-              <a14:hiddenFill xmlns:a14="http://schemas.microsoft.com/office/drawing/2010/main">
-                <a:solidFill>
-                  <a:srgbClr val="FFFFFF"/>
-                </a:solidFill>
-              </a14:hiddenFill>
-            </a:ext>
-          </a:extLst>
-        </p:spPr>
-      </p:pic>
     </p:spTree>
     <p:extLst>
       <p:ext uri="{BB962C8B-B14F-4D97-AF65-F5344CB8AC3E}">

</xml_diff>